<commit_message>
Github related slides added
</commit_message>
<xml_diff>
--- a/Stock price analysis and prediction.pptx
+++ b/Stock price analysis and prediction.pptx
@@ -7,20 +7,22 @@
   <p:sldIdLst>
     <p:sldId id="256" r:id="rId2"/>
     <p:sldId id="263" r:id="rId3"/>
-    <p:sldId id="269" r:id="rId4"/>
-    <p:sldId id="257" r:id="rId5"/>
-    <p:sldId id="258" r:id="rId6"/>
-    <p:sldId id="259" r:id="rId7"/>
-    <p:sldId id="265" r:id="rId8"/>
-    <p:sldId id="270" r:id="rId9"/>
-    <p:sldId id="271" r:id="rId10"/>
-    <p:sldId id="267" r:id="rId11"/>
-    <p:sldId id="272" r:id="rId12"/>
-    <p:sldId id="268" r:id="rId13"/>
-    <p:sldId id="266" r:id="rId14"/>
-    <p:sldId id="260" r:id="rId15"/>
-    <p:sldId id="262" r:id="rId16"/>
-    <p:sldId id="264" r:id="rId17"/>
+    <p:sldId id="274" r:id="rId4"/>
+    <p:sldId id="273" r:id="rId5"/>
+    <p:sldId id="269" r:id="rId6"/>
+    <p:sldId id="257" r:id="rId7"/>
+    <p:sldId id="258" r:id="rId8"/>
+    <p:sldId id="259" r:id="rId9"/>
+    <p:sldId id="265" r:id="rId10"/>
+    <p:sldId id="270" r:id="rId11"/>
+    <p:sldId id="271" r:id="rId12"/>
+    <p:sldId id="267" r:id="rId13"/>
+    <p:sldId id="272" r:id="rId14"/>
+    <p:sldId id="268" r:id="rId15"/>
+    <p:sldId id="266" r:id="rId16"/>
+    <p:sldId id="260" r:id="rId17"/>
+    <p:sldId id="262" r:id="rId18"/>
+    <p:sldId id="264" r:id="rId19"/>
   </p:sldIdLst>
   <p:sldSz cx="12192000" cy="6858000"/>
   <p:notesSz cx="6858000" cy="9144000"/>
@@ -3492,6 +3494,309 @@
             </a:r>
             <a:r>
               <a:rPr lang="cs-CZ" dirty="0"/>
+              <a:t> model: R </a:t>
+            </a:r>
+            <a:r>
+              <a:rPr lang="cs-CZ" dirty="0" err="1"/>
+              <a:t>squared</a:t>
+            </a:r>
+            <a:endParaRPr lang="cs-CZ" dirty="0"/>
+          </a:p>
+        </p:txBody>
+      </p:sp>
+      <p:pic>
+        <p:nvPicPr>
+          <p:cNvPr id="6" name="Obrázek 5">
+            <a:extLst>
+              <a:ext uri="{FF2B5EF4-FFF2-40B4-BE49-F238E27FC236}">
+                <a16:creationId xmlns:a16="http://schemas.microsoft.com/office/drawing/2014/main" id="{8FBB8A25-9426-3E6A-AE36-4DDF1E613F65}"/>
+              </a:ext>
+            </a:extLst>
+          </p:cNvPr>
+          <p:cNvPicPr>
+            <a:picLocks noChangeAspect="1"/>
+          </p:cNvPicPr>
+          <p:nvPr/>
+        </p:nvPicPr>
+        <p:blipFill>
+          <a:blip r:embed="rId2"/>
+          <a:stretch>
+            <a:fillRect/>
+          </a:stretch>
+        </p:blipFill>
+        <p:spPr>
+          <a:xfrm>
+            <a:off x="363616" y="2160772"/>
+            <a:ext cx="5360910" cy="898263"/>
+          </a:xfrm>
+          <a:prstGeom prst="rect">
+            <a:avLst/>
+          </a:prstGeom>
+        </p:spPr>
+      </p:pic>
+      <p:pic>
+        <p:nvPicPr>
+          <p:cNvPr id="8" name="Obrázek 7">
+            <a:extLst>
+              <a:ext uri="{FF2B5EF4-FFF2-40B4-BE49-F238E27FC236}">
+                <a16:creationId xmlns:a16="http://schemas.microsoft.com/office/drawing/2014/main" id="{5E4A6091-6A6F-5F43-692F-A067E19B1473}"/>
+              </a:ext>
+            </a:extLst>
+          </p:cNvPr>
+          <p:cNvPicPr>
+            <a:picLocks noChangeAspect="1"/>
+          </p:cNvPicPr>
+          <p:nvPr/>
+        </p:nvPicPr>
+        <p:blipFill>
+          <a:blip r:embed="rId3">
+            <a:extLst>
+              <a:ext uri="{28A0092B-C50C-407E-A947-70E740481C1C}">
+                <a14:useLocalDpi xmlns:a14="http://schemas.microsoft.com/office/drawing/2010/main" val="0"/>
+              </a:ext>
+            </a:extLst>
+          </a:blip>
+          <a:stretch>
+            <a:fillRect/>
+          </a:stretch>
+        </p:blipFill>
+        <p:spPr>
+          <a:xfrm>
+            <a:off x="5724526" y="1465447"/>
+            <a:ext cx="5360910" cy="5219558"/>
+          </a:xfrm>
+          <a:prstGeom prst="rect">
+            <a:avLst/>
+          </a:prstGeom>
+        </p:spPr>
+      </p:pic>
+      <p:pic>
+        <p:nvPicPr>
+          <p:cNvPr id="10" name="Obrázek 9">
+            <a:extLst>
+              <a:ext uri="{FF2B5EF4-FFF2-40B4-BE49-F238E27FC236}">
+                <a16:creationId xmlns:a16="http://schemas.microsoft.com/office/drawing/2014/main" id="{27DF01A3-AE4F-DD67-C327-F846816D31C1}"/>
+              </a:ext>
+            </a:extLst>
+          </p:cNvPr>
+          <p:cNvPicPr>
+            <a:picLocks noChangeAspect="1"/>
+          </p:cNvPicPr>
+          <p:nvPr/>
+        </p:nvPicPr>
+        <p:blipFill>
+          <a:blip r:embed="rId4"/>
+          <a:stretch>
+            <a:fillRect/>
+          </a:stretch>
+        </p:blipFill>
+        <p:spPr>
+          <a:xfrm>
+            <a:off x="838200" y="4175253"/>
+            <a:ext cx="4522159" cy="1177797"/>
+          </a:xfrm>
+          <a:prstGeom prst="rect">
+            <a:avLst/>
+          </a:prstGeom>
+        </p:spPr>
+      </p:pic>
+    </p:spTree>
+    <p:extLst>
+      <p:ext uri="{BB962C8B-B14F-4D97-AF65-F5344CB8AC3E}">
+        <p14:creationId xmlns:p14="http://schemas.microsoft.com/office/powerpoint/2010/main" val="3056370280"/>
+      </p:ext>
+    </p:extLst>
+  </p:cSld>
+  <p:clrMapOvr>
+    <a:masterClrMapping/>
+  </p:clrMapOvr>
+</p:sld>
+</file>
+
+<file path=ppt/slides/slide11.xml><?xml version="1.0" encoding="utf-8"?>
+<p:sld xmlns:a="http://schemas.openxmlformats.org/drawingml/2006/main" xmlns:r="http://schemas.openxmlformats.org/officeDocument/2006/relationships" xmlns:p="http://schemas.openxmlformats.org/presentationml/2006/main">
+  <p:cSld>
+    <p:spTree>
+      <p:nvGrpSpPr>
+        <p:cNvPr id="1" name=""/>
+        <p:cNvGrpSpPr/>
+        <p:nvPr/>
+      </p:nvGrpSpPr>
+      <p:grpSpPr>
+        <a:xfrm>
+          <a:off x="0" y="0"/>
+          <a:ext cx="0" cy="0"/>
+          <a:chOff x="0" y="0"/>
+          <a:chExt cx="0" cy="0"/>
+        </a:xfrm>
+      </p:grpSpPr>
+      <p:sp>
+        <p:nvSpPr>
+          <p:cNvPr id="2" name="Nadpis 1">
+            <a:extLst>
+              <a:ext uri="{FF2B5EF4-FFF2-40B4-BE49-F238E27FC236}">
+                <a16:creationId xmlns:a16="http://schemas.microsoft.com/office/drawing/2014/main" id="{84ADE2E0-8DC8-AD51-BCF4-41720D770541}"/>
+              </a:ext>
+            </a:extLst>
+          </p:cNvPr>
+          <p:cNvSpPr>
+            <a:spLocks noGrp="1"/>
+          </p:cNvSpPr>
+          <p:nvPr>
+            <p:ph type="title"/>
+          </p:nvPr>
+        </p:nvSpPr>
+        <p:spPr/>
+        <p:txBody>
+          <a:bodyPr/>
+          <a:lstStyle/>
+          <a:p>
+            <a:r>
+              <a:rPr lang="cs-CZ" dirty="0" err="1"/>
+              <a:t>Residuals</a:t>
+            </a:r>
+            <a:endParaRPr lang="cs-CZ" dirty="0"/>
+          </a:p>
+        </p:txBody>
+      </p:sp>
+      <p:pic>
+        <p:nvPicPr>
+          <p:cNvPr id="7" name="Obrázek 6">
+            <a:extLst>
+              <a:ext uri="{FF2B5EF4-FFF2-40B4-BE49-F238E27FC236}">
+                <a16:creationId xmlns:a16="http://schemas.microsoft.com/office/drawing/2014/main" id="{C924DFF7-DE5E-111E-E6EB-B03F2F4437C6}"/>
+              </a:ext>
+            </a:extLst>
+          </p:cNvPr>
+          <p:cNvPicPr>
+            <a:picLocks noChangeAspect="1"/>
+          </p:cNvPicPr>
+          <p:nvPr/>
+        </p:nvPicPr>
+        <p:blipFill>
+          <a:blip r:embed="rId2"/>
+          <a:stretch>
+            <a:fillRect/>
+          </a:stretch>
+        </p:blipFill>
+        <p:spPr>
+          <a:xfrm>
+            <a:off x="5191087" y="204703"/>
+            <a:ext cx="6648145" cy="2902711"/>
+          </a:xfrm>
+          <a:prstGeom prst="rect">
+            <a:avLst/>
+          </a:prstGeom>
+        </p:spPr>
+      </p:pic>
+      <p:pic>
+        <p:nvPicPr>
+          <p:cNvPr id="5" name="Zástupný obsah 4">
+            <a:extLst>
+              <a:ext uri="{FF2B5EF4-FFF2-40B4-BE49-F238E27FC236}">
+                <a16:creationId xmlns:a16="http://schemas.microsoft.com/office/drawing/2014/main" id="{27E15DA9-96D3-3B68-27D2-235D1E2A2C95}"/>
+              </a:ext>
+            </a:extLst>
+          </p:cNvPr>
+          <p:cNvPicPr>
+            <a:picLocks noGrp="1" noChangeAspect="1"/>
+          </p:cNvPicPr>
+          <p:nvPr>
+            <p:ph idx="1"/>
+          </p:nvPr>
+        </p:nvPicPr>
+        <p:blipFill>
+          <a:blip r:embed="rId3">
+            <a:extLst>
+              <a:ext uri="{28A0092B-C50C-407E-A947-70E740481C1C}">
+                <a14:useLocalDpi xmlns:a14="http://schemas.microsoft.com/office/drawing/2010/main" val="0"/>
+              </a:ext>
+            </a:extLst>
+          </a:blip>
+          <a:stretch>
+            <a:fillRect/>
+          </a:stretch>
+        </p:blipFill>
+        <p:spPr>
+          <a:xfrm>
+            <a:off x="346230" y="2247191"/>
+            <a:ext cx="6648144" cy="4610809"/>
+          </a:xfrm>
+        </p:spPr>
+      </p:pic>
+    </p:spTree>
+    <p:extLst>
+      <p:ext uri="{BB962C8B-B14F-4D97-AF65-F5344CB8AC3E}">
+        <p14:creationId xmlns:p14="http://schemas.microsoft.com/office/powerpoint/2010/main" val="2383595441"/>
+      </p:ext>
+    </p:extLst>
+  </p:cSld>
+  <p:clrMapOvr>
+    <a:masterClrMapping/>
+  </p:clrMapOvr>
+</p:sld>
+</file>
+
+<file path=ppt/slides/slide12.xml><?xml version="1.0" encoding="utf-8"?>
+<p:sld xmlns:a="http://schemas.openxmlformats.org/drawingml/2006/main" xmlns:r="http://schemas.openxmlformats.org/officeDocument/2006/relationships" xmlns:p="http://schemas.openxmlformats.org/presentationml/2006/main">
+  <p:cSld>
+    <p:spTree>
+      <p:nvGrpSpPr>
+        <p:cNvPr id="1" name=""/>
+        <p:cNvGrpSpPr/>
+        <p:nvPr/>
+      </p:nvGrpSpPr>
+      <p:grpSpPr>
+        <a:xfrm>
+          <a:off x="0" y="0"/>
+          <a:ext cx="0" cy="0"/>
+          <a:chOff x="0" y="0"/>
+          <a:chExt cx="0" cy="0"/>
+        </a:xfrm>
+      </p:grpSpPr>
+      <p:sp>
+        <p:nvSpPr>
+          <p:cNvPr id="2" name="Nadpis 1">
+            <a:extLst>
+              <a:ext uri="{FF2B5EF4-FFF2-40B4-BE49-F238E27FC236}">
+                <a16:creationId xmlns:a16="http://schemas.microsoft.com/office/drawing/2014/main" id="{1D4C3059-B7F0-0753-2058-A3DDF76B6879}"/>
+              </a:ext>
+            </a:extLst>
+          </p:cNvPr>
+          <p:cNvSpPr>
+            <a:spLocks noGrp="1"/>
+          </p:cNvSpPr>
+          <p:nvPr>
+            <p:ph type="title"/>
+          </p:nvPr>
+        </p:nvSpPr>
+        <p:spPr/>
+        <p:txBody>
+          <a:bodyPr/>
+          <a:lstStyle/>
+          <a:p>
+            <a:r>
+              <a:rPr lang="cs-CZ" dirty="0" err="1"/>
+              <a:t>Problems</a:t>
+            </a:r>
+            <a:r>
+              <a:rPr lang="cs-CZ" dirty="0"/>
+              <a:t> </a:t>
+            </a:r>
+            <a:r>
+              <a:rPr lang="cs-CZ" dirty="0" err="1"/>
+              <a:t>with</a:t>
+            </a:r>
+            <a:r>
+              <a:rPr lang="cs-CZ" dirty="0"/>
+              <a:t> </a:t>
+            </a:r>
+            <a:r>
+              <a:rPr lang="cs-CZ" dirty="0" err="1"/>
+              <a:t>the</a:t>
+            </a:r>
+            <a:r>
+              <a:rPr lang="cs-CZ" dirty="0"/>
               <a:t> model: </a:t>
             </a:r>
             <a:r>
@@ -3564,7 +3869,7 @@
 </p:sld>
 </file>
 
-<file path=ppt/slides/slide11.xml><?xml version="1.0" encoding="utf-8"?>
+<file path=ppt/slides/slide13.xml><?xml version="1.0" encoding="utf-8"?>
 <p:sld xmlns:a="http://schemas.openxmlformats.org/drawingml/2006/main" xmlns:r="http://schemas.openxmlformats.org/officeDocument/2006/relationships" xmlns:p="http://schemas.openxmlformats.org/presentationml/2006/main">
   <p:cSld>
     <p:spTree>
@@ -3695,7 +4000,7 @@
 </p:sld>
 </file>
 
-<file path=ppt/slides/slide12.xml><?xml version="1.0" encoding="utf-8"?>
+<file path=ppt/slides/slide14.xml><?xml version="1.0" encoding="utf-8"?>
 <p:sld xmlns:a="http://schemas.openxmlformats.org/drawingml/2006/main" xmlns:r="http://schemas.openxmlformats.org/officeDocument/2006/relationships" xmlns:p="http://schemas.openxmlformats.org/presentationml/2006/main">
   <p:cSld>
     <p:spTree>
@@ -3900,7 +4205,7 @@
 </p:sld>
 </file>
 
-<file path=ppt/slides/slide13.xml><?xml version="1.0" encoding="utf-8"?>
+<file path=ppt/slides/slide15.xml><?xml version="1.0" encoding="utf-8"?>
 <p:sld xmlns:a="http://schemas.openxmlformats.org/drawingml/2006/main" xmlns:r="http://schemas.openxmlformats.org/officeDocument/2006/relationships" xmlns:p="http://schemas.openxmlformats.org/presentationml/2006/main">
   <p:cSld>
     <p:bg>
@@ -4112,7 +4417,7 @@
 </p:sld>
 </file>
 
-<file path=ppt/slides/slide14.xml><?xml version="1.0" encoding="utf-8"?>
+<file path=ppt/slides/slide16.xml><?xml version="1.0" encoding="utf-8"?>
 <p:sld xmlns:a="http://schemas.openxmlformats.org/drawingml/2006/main" xmlns:r="http://schemas.openxmlformats.org/officeDocument/2006/relationships" xmlns:p="http://schemas.openxmlformats.org/presentationml/2006/main">
   <p:cSld>
     <p:spTree>
@@ -4223,7 +4528,7 @@
 </p:sld>
 </file>
 
-<file path=ppt/slides/slide15.xml><?xml version="1.0" encoding="utf-8"?>
+<file path=ppt/slides/slide17.xml><?xml version="1.0" encoding="utf-8"?>
 <p:sld xmlns:a="http://schemas.openxmlformats.org/drawingml/2006/main" xmlns:r="http://schemas.openxmlformats.org/officeDocument/2006/relationships" xmlns:p="http://schemas.openxmlformats.org/presentationml/2006/main">
   <p:cSld>
     <p:spTree>
@@ -4315,7 +4620,7 @@
 </p:sld>
 </file>
 
-<file path=ppt/slides/slide16.xml><?xml version="1.0" encoding="utf-8"?>
+<file path=ppt/slides/slide18.xml><?xml version="1.0" encoding="utf-8"?>
 <p:sld xmlns:a="http://schemas.openxmlformats.org/drawingml/2006/main" xmlns:r="http://schemas.openxmlformats.org/officeDocument/2006/relationships" xmlns:p="http://schemas.openxmlformats.org/presentationml/2006/main">
   <p:cSld>
     <p:spTree>
@@ -4455,31 +4760,77 @@
           </a:p>
         </p:txBody>
       </p:sp>
-      <p:sp>
-        <p:nvSpPr>
-          <p:cNvPr id="3" name="Zástupný obsah 2">
-            <a:extLst>
-              <a:ext uri="{FF2B5EF4-FFF2-40B4-BE49-F238E27FC236}">
-                <a16:creationId xmlns:a16="http://schemas.microsoft.com/office/drawing/2014/main" id="{06E6F511-0651-102B-1DFC-EF8C004E6C76}"/>
-              </a:ext>
-            </a:extLst>
-          </p:cNvPr>
-          <p:cNvSpPr>
-            <a:spLocks noGrp="1"/>
-          </p:cNvSpPr>
+      <p:pic>
+        <p:nvPicPr>
+          <p:cNvPr id="5" name="Zástupný obsah 4" descr="Obsah obrázku text, podepsat&#10;&#10;Popis byl vytvořen automaticky">
+            <a:extLst>
+              <a:ext uri="{FF2B5EF4-FFF2-40B4-BE49-F238E27FC236}">
+                <a16:creationId xmlns:a16="http://schemas.microsoft.com/office/drawing/2014/main" id="{CA1A6D64-6F8A-0186-7915-7D8E2D8499F5}"/>
+              </a:ext>
+            </a:extLst>
+          </p:cNvPr>
+          <p:cNvPicPr>
+            <a:picLocks noGrp="1" noChangeAspect="1"/>
+          </p:cNvPicPr>
           <p:nvPr>
             <p:ph idx="1"/>
           </p:nvPr>
-        </p:nvSpPr>
-        <p:spPr/>
-        <p:txBody>
-          <a:bodyPr/>
-          <a:lstStyle/>
-          <a:p>
-            <a:endParaRPr lang="cs-CZ" dirty="0"/>
-          </a:p>
-        </p:txBody>
-      </p:sp>
+        </p:nvPicPr>
+        <p:blipFill>
+          <a:blip r:embed="rId2">
+            <a:extLst>
+              <a:ext uri="{28A0092B-C50C-407E-A947-70E740481C1C}">
+                <a14:useLocalDpi xmlns:a14="http://schemas.microsoft.com/office/drawing/2010/main" val="0"/>
+              </a:ext>
+            </a:extLst>
+          </a:blip>
+          <a:stretch>
+            <a:fillRect/>
+          </a:stretch>
+        </p:blipFill>
+        <p:spPr>
+          <a:xfrm>
+            <a:off x="838200" y="2281237"/>
+            <a:ext cx="2857500" cy="2295525"/>
+          </a:xfrm>
+        </p:spPr>
+      </p:pic>
+      <p:pic>
+        <p:nvPicPr>
+          <p:cNvPr id="7" name="Obrázek 6">
+            <a:extLst>
+              <a:ext uri="{FF2B5EF4-FFF2-40B4-BE49-F238E27FC236}">
+                <a16:creationId xmlns:a16="http://schemas.microsoft.com/office/drawing/2014/main" id="{30D9E72C-9318-A0F0-020E-CA4290500977}"/>
+              </a:ext>
+            </a:extLst>
+          </p:cNvPr>
+          <p:cNvPicPr>
+            <a:picLocks noChangeAspect="1"/>
+          </p:cNvPicPr>
+          <p:nvPr/>
+        </p:nvPicPr>
+        <p:blipFill>
+          <a:blip r:embed="rId3">
+            <a:extLst>
+              <a:ext uri="{28A0092B-C50C-407E-A947-70E740481C1C}">
+                <a14:useLocalDpi xmlns:a14="http://schemas.microsoft.com/office/drawing/2010/main" val="0"/>
+              </a:ext>
+            </a:extLst>
+          </a:blip>
+          <a:stretch>
+            <a:fillRect/>
+          </a:stretch>
+        </p:blipFill>
+        <p:spPr>
+          <a:xfrm>
+            <a:off x="3990974" y="1690688"/>
+            <a:ext cx="7839075" cy="4202391"/>
+          </a:xfrm>
+          <a:prstGeom prst="rect">
+            <a:avLst/>
+          </a:prstGeom>
+        </p:spPr>
+      </p:pic>
     </p:spTree>
     <p:extLst>
       <p:ext uri="{BB962C8B-B14F-4D97-AF65-F5344CB8AC3E}">
@@ -4515,7 +4866,7 @@
           <p:cNvPr id="2" name="Nadpis 1">
             <a:extLst>
               <a:ext uri="{FF2B5EF4-FFF2-40B4-BE49-F238E27FC236}">
-                <a16:creationId xmlns:a16="http://schemas.microsoft.com/office/drawing/2014/main" id="{02A9521C-877E-7D73-AE23-BBAD223AAFD0}"/>
+                <a16:creationId xmlns:a16="http://schemas.microsoft.com/office/drawing/2014/main" id="{D891AA4A-0AA8-E8F8-8187-B6FE3569DBBB}"/>
               </a:ext>
             </a:extLst>
           </p:cNvPr>
@@ -4533,60 +4884,67 @@
           <a:p>
             <a:r>
               <a:rPr lang="cs-CZ" dirty="0" err="1"/>
-              <a:t>Interesting</a:t>
+              <a:t>Cooperation</a:t>
             </a:r>
             <a:r>
               <a:rPr lang="cs-CZ" dirty="0"/>
-              <a:t> </a:t>
+              <a:t> on a </a:t>
             </a:r>
             <a:r>
               <a:rPr lang="cs-CZ" dirty="0" err="1"/>
-              <a:t>agregations</a:t>
+              <a:t>project</a:t>
             </a:r>
             <a:r>
               <a:rPr lang="cs-CZ" dirty="0"/>
-              <a:t> and </a:t>
-            </a:r>
-            <a:r>
-              <a:rPr lang="cs-CZ" dirty="0" err="1"/>
-              <a:t>sumations</a:t>
-            </a:r>
-            <a:r>
-              <a:rPr lang="cs-CZ" dirty="0"/>
-              <a:t>…</a:t>
-            </a:r>
-          </a:p>
-        </p:txBody>
-      </p:sp>
-      <p:sp>
-        <p:nvSpPr>
-          <p:cNvPr id="3" name="Zástupný obsah 2">
-            <a:extLst>
-              <a:ext uri="{FF2B5EF4-FFF2-40B4-BE49-F238E27FC236}">
-                <a16:creationId xmlns:a16="http://schemas.microsoft.com/office/drawing/2014/main" id="{C0A3D9F4-492C-6EE1-51E4-45D4C60A7221}"/>
-              </a:ext>
-            </a:extLst>
-          </p:cNvPr>
-          <p:cNvSpPr>
-            <a:spLocks noGrp="1"/>
-          </p:cNvSpPr>
+              <a:t>: GitHub</a:t>
+            </a:r>
+          </a:p>
+        </p:txBody>
+      </p:sp>
+      <p:pic>
+        <p:nvPicPr>
+          <p:cNvPr id="5" name="Zástupný obsah 4" descr="Obsah obrázku text&#10;&#10;Popis byl vytvořen automaticky">
+            <a:extLst>
+              <a:ext uri="{FF2B5EF4-FFF2-40B4-BE49-F238E27FC236}">
+                <a16:creationId xmlns:a16="http://schemas.microsoft.com/office/drawing/2014/main" id="{D22C995A-EFB5-F33D-9427-DFCB857267C3}"/>
+              </a:ext>
+            </a:extLst>
+          </p:cNvPr>
+          <p:cNvPicPr>
+            <a:picLocks noGrp="1" noChangeAspect="1"/>
+          </p:cNvPicPr>
           <p:nvPr>
             <p:ph idx="1"/>
           </p:nvPr>
-        </p:nvSpPr>
-        <p:spPr/>
-        <p:txBody>
-          <a:bodyPr/>
-          <a:lstStyle/>
-          <a:p>
-            <a:endParaRPr lang="cs-CZ"/>
-          </a:p>
-        </p:txBody>
-      </p:sp>
+        </p:nvPicPr>
+        <p:blipFill>
+          <a:blip r:embed="rId2">
+            <a:extLst>
+              <a:ext uri="{28A0092B-C50C-407E-A947-70E740481C1C}">
+                <a14:useLocalDpi xmlns:a14="http://schemas.microsoft.com/office/drawing/2010/main" val="0"/>
+              </a:ext>
+            </a:extLst>
+          </a:blip>
+          <a:stretch>
+            <a:fillRect/>
+          </a:stretch>
+        </p:blipFill>
+        <p:spPr>
+          <a:xfrm>
+            <a:off x="2692036" y="1690688"/>
+            <a:ext cx="6807927" cy="4504579"/>
+          </a:xfrm>
+          <a:ln>
+            <a:solidFill>
+              <a:schemeClr val="tx1"/>
+            </a:solidFill>
+          </a:ln>
+        </p:spPr>
+      </p:pic>
     </p:spTree>
     <p:extLst>
       <p:ext uri="{BB962C8B-B14F-4D97-AF65-F5344CB8AC3E}">
-        <p14:creationId xmlns:p14="http://schemas.microsoft.com/office/powerpoint/2010/main" val="331672717"/>
+        <p14:creationId xmlns:p14="http://schemas.microsoft.com/office/powerpoint/2010/main" val="3283852819"/>
       </p:ext>
     </p:extLst>
   </p:cSld>
@@ -4618,7 +4976,7 @@
           <p:cNvPr id="2" name="Nadpis 1">
             <a:extLst>
               <a:ext uri="{FF2B5EF4-FFF2-40B4-BE49-F238E27FC236}">
-                <a16:creationId xmlns:a16="http://schemas.microsoft.com/office/drawing/2014/main" id="{02A9521C-877E-7D73-AE23-BBAD223AAFD0}"/>
+                <a16:creationId xmlns:a16="http://schemas.microsoft.com/office/drawing/2014/main" id="{922A90D1-06B2-8E35-9BC2-95875CA1DE5F}"/>
               </a:ext>
             </a:extLst>
           </p:cNvPr>
@@ -4636,68 +4994,76 @@
           <a:p>
             <a:r>
               <a:rPr lang="cs-CZ" dirty="0" err="1"/>
-              <a:t>Matipulation</a:t>
+              <a:t>Cooperation</a:t>
             </a:r>
             <a:r>
               <a:rPr lang="cs-CZ" dirty="0"/>
-              <a:t> </a:t>
+              <a:t> on a </a:t>
             </a:r>
             <a:r>
               <a:rPr lang="cs-CZ" dirty="0" err="1"/>
-              <a:t>of</a:t>
+              <a:t>project</a:t>
             </a:r>
             <a:r>
               <a:rPr lang="cs-CZ" dirty="0"/>
-              <a:t> data </a:t>
-            </a:r>
-            <a:r>
-              <a:rPr lang="cs-CZ" dirty="0" err="1"/>
-              <a:t>with</a:t>
-            </a:r>
-            <a:r>
-              <a:rPr lang="cs-CZ" dirty="0"/>
-              <a:t> </a:t>
-            </a:r>
-            <a:r>
-              <a:rPr lang="cs-CZ" dirty="0" err="1"/>
-              <a:t>pandas</a:t>
-            </a:r>
-            <a:r>
-              <a:rPr lang="cs-CZ" dirty="0"/>
-              <a:t> </a:t>
-            </a:r>
-          </a:p>
-        </p:txBody>
-      </p:sp>
-      <p:sp>
-        <p:nvSpPr>
-          <p:cNvPr id="3" name="Zástupný obsah 2">
-            <a:extLst>
-              <a:ext uri="{FF2B5EF4-FFF2-40B4-BE49-F238E27FC236}">
-                <a16:creationId xmlns:a16="http://schemas.microsoft.com/office/drawing/2014/main" id="{C0A3D9F4-492C-6EE1-51E4-45D4C60A7221}"/>
-              </a:ext>
-            </a:extLst>
-          </p:cNvPr>
-          <p:cNvSpPr>
-            <a:spLocks noGrp="1"/>
-          </p:cNvSpPr>
+              <a:t>: GitHub</a:t>
+            </a:r>
+          </a:p>
+        </p:txBody>
+      </p:sp>
+      <p:pic>
+        <p:nvPicPr>
+          <p:cNvPr id="1026" name="Picture 2">
+            <a:extLst>
+              <a:ext uri="{FF2B5EF4-FFF2-40B4-BE49-F238E27FC236}">
+                <a16:creationId xmlns:a16="http://schemas.microsoft.com/office/drawing/2014/main" id="{4F487E3E-888C-0EF7-3C38-E2AB1E5BFE5B}"/>
+              </a:ext>
+            </a:extLst>
+          </p:cNvPr>
+          <p:cNvPicPr>
+            <a:picLocks noGrp="1" noChangeAspect="1" noChangeArrowheads="1"/>
+          </p:cNvPicPr>
           <p:nvPr>
             <p:ph idx="1"/>
           </p:nvPr>
-        </p:nvSpPr>
-        <p:spPr/>
-        <p:txBody>
-          <a:bodyPr/>
-          <a:lstStyle/>
-          <a:p>
-            <a:endParaRPr lang="cs-CZ"/>
-          </a:p>
-        </p:txBody>
-      </p:sp>
+        </p:nvPicPr>
+        <p:blipFill>
+          <a:blip r:embed="rId2">
+            <a:extLst>
+              <a:ext uri="{28A0092B-C50C-407E-A947-70E740481C1C}">
+                <a14:useLocalDpi xmlns:a14="http://schemas.microsoft.com/office/drawing/2010/main" val="0"/>
+              </a:ext>
+            </a:extLst>
+          </a:blip>
+          <a:srcRect/>
+          <a:stretch>
+            <a:fillRect/>
+          </a:stretch>
+        </p:blipFill>
+        <p:spPr bwMode="auto">
+          <a:xfrm>
+            <a:off x="1865532" y="1825625"/>
+            <a:ext cx="8460935" cy="4351338"/>
+          </a:xfrm>
+          <a:prstGeom prst="rect">
+            <a:avLst/>
+          </a:prstGeom>
+          <a:noFill/>
+          <a:extLst>
+            <a:ext uri="{909E8E84-426E-40DD-AFC4-6F175D3DCCD1}">
+              <a14:hiddenFill xmlns:a14="http://schemas.microsoft.com/office/drawing/2010/main">
+                <a:solidFill>
+                  <a:srgbClr val="FFFFFF"/>
+                </a:solidFill>
+              </a14:hiddenFill>
+            </a:ext>
+          </a:extLst>
+        </p:spPr>
+      </p:pic>
     </p:spTree>
     <p:extLst>
       <p:ext uri="{BB962C8B-B14F-4D97-AF65-F5344CB8AC3E}">
-        <p14:creationId xmlns:p14="http://schemas.microsoft.com/office/powerpoint/2010/main" val="2416847899"/>
+        <p14:creationId xmlns:p14="http://schemas.microsoft.com/office/powerpoint/2010/main" val="832256936"/>
       </p:ext>
     </p:extLst>
   </p:cSld>
@@ -4729,6 +5095,220 @@
           <p:cNvPr id="2" name="Nadpis 1">
             <a:extLst>
               <a:ext uri="{FF2B5EF4-FFF2-40B4-BE49-F238E27FC236}">
+                <a16:creationId xmlns:a16="http://schemas.microsoft.com/office/drawing/2014/main" id="{02A9521C-877E-7D73-AE23-BBAD223AAFD0}"/>
+              </a:ext>
+            </a:extLst>
+          </p:cNvPr>
+          <p:cNvSpPr>
+            <a:spLocks noGrp="1"/>
+          </p:cNvSpPr>
+          <p:nvPr>
+            <p:ph type="title"/>
+          </p:nvPr>
+        </p:nvSpPr>
+        <p:spPr/>
+        <p:txBody>
+          <a:bodyPr/>
+          <a:lstStyle/>
+          <a:p>
+            <a:r>
+              <a:rPr lang="cs-CZ" dirty="0" err="1"/>
+              <a:t>Interesting</a:t>
+            </a:r>
+            <a:r>
+              <a:rPr lang="cs-CZ" dirty="0"/>
+              <a:t> </a:t>
+            </a:r>
+            <a:r>
+              <a:rPr lang="cs-CZ" dirty="0" err="1"/>
+              <a:t>agregations</a:t>
+            </a:r>
+            <a:r>
+              <a:rPr lang="cs-CZ" dirty="0"/>
+              <a:t> and </a:t>
+            </a:r>
+            <a:r>
+              <a:rPr lang="cs-CZ" dirty="0" err="1"/>
+              <a:t>sumations</a:t>
+            </a:r>
+            <a:r>
+              <a:rPr lang="cs-CZ" dirty="0"/>
+              <a:t>…</a:t>
+            </a:r>
+          </a:p>
+        </p:txBody>
+      </p:sp>
+      <p:sp>
+        <p:nvSpPr>
+          <p:cNvPr id="3" name="Zástupný obsah 2">
+            <a:extLst>
+              <a:ext uri="{FF2B5EF4-FFF2-40B4-BE49-F238E27FC236}">
+                <a16:creationId xmlns:a16="http://schemas.microsoft.com/office/drawing/2014/main" id="{C0A3D9F4-492C-6EE1-51E4-45D4C60A7221}"/>
+              </a:ext>
+            </a:extLst>
+          </p:cNvPr>
+          <p:cNvSpPr>
+            <a:spLocks noGrp="1"/>
+          </p:cNvSpPr>
+          <p:nvPr>
+            <p:ph idx="1"/>
+          </p:nvPr>
+        </p:nvSpPr>
+        <p:spPr/>
+        <p:txBody>
+          <a:bodyPr/>
+          <a:lstStyle/>
+          <a:p>
+            <a:endParaRPr lang="cs-CZ" dirty="0"/>
+          </a:p>
+        </p:txBody>
+      </p:sp>
+    </p:spTree>
+    <p:extLst>
+      <p:ext uri="{BB962C8B-B14F-4D97-AF65-F5344CB8AC3E}">
+        <p14:creationId xmlns:p14="http://schemas.microsoft.com/office/powerpoint/2010/main" val="331672717"/>
+      </p:ext>
+    </p:extLst>
+  </p:cSld>
+  <p:clrMapOvr>
+    <a:masterClrMapping/>
+  </p:clrMapOvr>
+</p:sld>
+</file>
+
+<file path=ppt/slides/slide6.xml><?xml version="1.0" encoding="utf-8"?>
+<p:sld xmlns:a="http://schemas.openxmlformats.org/drawingml/2006/main" xmlns:r="http://schemas.openxmlformats.org/officeDocument/2006/relationships" xmlns:p="http://schemas.openxmlformats.org/presentationml/2006/main">
+  <p:cSld>
+    <p:spTree>
+      <p:nvGrpSpPr>
+        <p:cNvPr id="1" name=""/>
+        <p:cNvGrpSpPr/>
+        <p:nvPr/>
+      </p:nvGrpSpPr>
+      <p:grpSpPr>
+        <a:xfrm>
+          <a:off x="0" y="0"/>
+          <a:ext cx="0" cy="0"/>
+          <a:chOff x="0" y="0"/>
+          <a:chExt cx="0" cy="0"/>
+        </a:xfrm>
+      </p:grpSpPr>
+      <p:sp>
+        <p:nvSpPr>
+          <p:cNvPr id="2" name="Nadpis 1">
+            <a:extLst>
+              <a:ext uri="{FF2B5EF4-FFF2-40B4-BE49-F238E27FC236}">
+                <a16:creationId xmlns:a16="http://schemas.microsoft.com/office/drawing/2014/main" id="{02A9521C-877E-7D73-AE23-BBAD223AAFD0}"/>
+              </a:ext>
+            </a:extLst>
+          </p:cNvPr>
+          <p:cNvSpPr>
+            <a:spLocks noGrp="1"/>
+          </p:cNvSpPr>
+          <p:nvPr>
+            <p:ph type="title"/>
+          </p:nvPr>
+        </p:nvSpPr>
+        <p:spPr/>
+        <p:txBody>
+          <a:bodyPr/>
+          <a:lstStyle/>
+          <a:p>
+            <a:r>
+              <a:rPr lang="cs-CZ" dirty="0" err="1"/>
+              <a:t>Matipulation</a:t>
+            </a:r>
+            <a:r>
+              <a:rPr lang="cs-CZ" dirty="0"/>
+              <a:t> </a:t>
+            </a:r>
+            <a:r>
+              <a:rPr lang="cs-CZ" dirty="0" err="1"/>
+              <a:t>of</a:t>
+            </a:r>
+            <a:r>
+              <a:rPr lang="cs-CZ" dirty="0"/>
+              <a:t> data </a:t>
+            </a:r>
+            <a:r>
+              <a:rPr lang="cs-CZ" dirty="0" err="1"/>
+              <a:t>with</a:t>
+            </a:r>
+            <a:r>
+              <a:rPr lang="cs-CZ" dirty="0"/>
+              <a:t> </a:t>
+            </a:r>
+            <a:r>
+              <a:rPr lang="cs-CZ" dirty="0" err="1"/>
+              <a:t>pandas</a:t>
+            </a:r>
+            <a:r>
+              <a:rPr lang="cs-CZ" dirty="0"/>
+              <a:t> </a:t>
+            </a:r>
+          </a:p>
+        </p:txBody>
+      </p:sp>
+      <p:sp>
+        <p:nvSpPr>
+          <p:cNvPr id="3" name="Zástupný obsah 2">
+            <a:extLst>
+              <a:ext uri="{FF2B5EF4-FFF2-40B4-BE49-F238E27FC236}">
+                <a16:creationId xmlns:a16="http://schemas.microsoft.com/office/drawing/2014/main" id="{C0A3D9F4-492C-6EE1-51E4-45D4C60A7221}"/>
+              </a:ext>
+            </a:extLst>
+          </p:cNvPr>
+          <p:cNvSpPr>
+            <a:spLocks noGrp="1"/>
+          </p:cNvSpPr>
+          <p:nvPr>
+            <p:ph idx="1"/>
+          </p:nvPr>
+        </p:nvSpPr>
+        <p:spPr/>
+        <p:txBody>
+          <a:bodyPr/>
+          <a:lstStyle/>
+          <a:p>
+            <a:endParaRPr lang="cs-CZ"/>
+          </a:p>
+        </p:txBody>
+      </p:sp>
+    </p:spTree>
+    <p:extLst>
+      <p:ext uri="{BB962C8B-B14F-4D97-AF65-F5344CB8AC3E}">
+        <p14:creationId xmlns:p14="http://schemas.microsoft.com/office/powerpoint/2010/main" val="2416847899"/>
+      </p:ext>
+    </p:extLst>
+  </p:cSld>
+  <p:clrMapOvr>
+    <a:masterClrMapping/>
+  </p:clrMapOvr>
+</p:sld>
+</file>
+
+<file path=ppt/slides/slide7.xml><?xml version="1.0" encoding="utf-8"?>
+<p:sld xmlns:a="http://schemas.openxmlformats.org/drawingml/2006/main" xmlns:r="http://schemas.openxmlformats.org/officeDocument/2006/relationships" xmlns:p="http://schemas.openxmlformats.org/presentationml/2006/main">
+  <p:cSld>
+    <p:spTree>
+      <p:nvGrpSpPr>
+        <p:cNvPr id="1" name=""/>
+        <p:cNvGrpSpPr/>
+        <p:nvPr/>
+      </p:nvGrpSpPr>
+      <p:grpSpPr>
+        <a:xfrm>
+          <a:off x="0" y="0"/>
+          <a:ext cx="0" cy="0"/>
+          <a:chOff x="0" y="0"/>
+          <a:chExt cx="0" cy="0"/>
+        </a:xfrm>
+      </p:grpSpPr>
+      <p:sp>
+        <p:nvSpPr>
+          <p:cNvPr id="2" name="Nadpis 1">
+            <a:extLst>
+              <a:ext uri="{FF2B5EF4-FFF2-40B4-BE49-F238E27FC236}">
                 <a16:creationId xmlns:a16="http://schemas.microsoft.com/office/drawing/2014/main" id="{7AEB1131-FD0C-4958-7265-0B3362DDEE11}"/>
               </a:ext>
             </a:extLst>
@@ -4799,7 +5379,7 @@
 </p:sld>
 </file>
 
-<file path=ppt/slides/slide6.xml><?xml version="1.0" encoding="utf-8"?>
+<file path=ppt/slides/slide8.xml><?xml version="1.0" encoding="utf-8"?>
 <p:sld xmlns:a="http://schemas.openxmlformats.org/drawingml/2006/main" xmlns:r="http://schemas.openxmlformats.org/officeDocument/2006/relationships" xmlns:p="http://schemas.openxmlformats.org/presentationml/2006/main">
   <p:cSld>
     <p:spTree>
@@ -4895,7 +5475,7 @@
 </p:sld>
 </file>
 
-<file path=ppt/slides/slide7.xml><?xml version="1.0" encoding="utf-8"?>
+<file path=ppt/slides/slide9.xml><?xml version="1.0" encoding="utf-8"?>
 <p:sld xmlns:a="http://schemas.openxmlformats.org/drawingml/2006/main" xmlns:r="http://schemas.openxmlformats.org/officeDocument/2006/relationships" xmlns:p="http://schemas.openxmlformats.org/presentationml/2006/main">
   <p:cSld>
     <p:spTree>
@@ -5011,309 +5591,6 @@
     <p:extLst>
       <p:ext uri="{BB962C8B-B14F-4D97-AF65-F5344CB8AC3E}">
         <p14:creationId xmlns:p14="http://schemas.microsoft.com/office/powerpoint/2010/main" val="411680979"/>
-      </p:ext>
-    </p:extLst>
-  </p:cSld>
-  <p:clrMapOvr>
-    <a:masterClrMapping/>
-  </p:clrMapOvr>
-</p:sld>
-</file>
-
-<file path=ppt/slides/slide8.xml><?xml version="1.0" encoding="utf-8"?>
-<p:sld xmlns:a="http://schemas.openxmlformats.org/drawingml/2006/main" xmlns:r="http://schemas.openxmlformats.org/officeDocument/2006/relationships" xmlns:p="http://schemas.openxmlformats.org/presentationml/2006/main">
-  <p:cSld>
-    <p:spTree>
-      <p:nvGrpSpPr>
-        <p:cNvPr id="1" name=""/>
-        <p:cNvGrpSpPr/>
-        <p:nvPr/>
-      </p:nvGrpSpPr>
-      <p:grpSpPr>
-        <a:xfrm>
-          <a:off x="0" y="0"/>
-          <a:ext cx="0" cy="0"/>
-          <a:chOff x="0" y="0"/>
-          <a:chExt cx="0" cy="0"/>
-        </a:xfrm>
-      </p:grpSpPr>
-      <p:sp>
-        <p:nvSpPr>
-          <p:cNvPr id="2" name="Nadpis 1">
-            <a:extLst>
-              <a:ext uri="{FF2B5EF4-FFF2-40B4-BE49-F238E27FC236}">
-                <a16:creationId xmlns:a16="http://schemas.microsoft.com/office/drawing/2014/main" id="{1D4C3059-B7F0-0753-2058-A3DDF76B6879}"/>
-              </a:ext>
-            </a:extLst>
-          </p:cNvPr>
-          <p:cNvSpPr>
-            <a:spLocks noGrp="1"/>
-          </p:cNvSpPr>
-          <p:nvPr>
-            <p:ph type="title"/>
-          </p:nvPr>
-        </p:nvSpPr>
-        <p:spPr/>
-        <p:txBody>
-          <a:bodyPr/>
-          <a:lstStyle/>
-          <a:p>
-            <a:r>
-              <a:rPr lang="cs-CZ" dirty="0" err="1"/>
-              <a:t>Problems</a:t>
-            </a:r>
-            <a:r>
-              <a:rPr lang="cs-CZ" dirty="0"/>
-              <a:t> </a:t>
-            </a:r>
-            <a:r>
-              <a:rPr lang="cs-CZ" dirty="0" err="1"/>
-              <a:t>with</a:t>
-            </a:r>
-            <a:r>
-              <a:rPr lang="cs-CZ" dirty="0"/>
-              <a:t> </a:t>
-            </a:r>
-            <a:r>
-              <a:rPr lang="cs-CZ" dirty="0" err="1"/>
-              <a:t>the</a:t>
-            </a:r>
-            <a:r>
-              <a:rPr lang="cs-CZ" dirty="0"/>
-              <a:t> model: R </a:t>
-            </a:r>
-            <a:r>
-              <a:rPr lang="cs-CZ" dirty="0" err="1"/>
-              <a:t>squared</a:t>
-            </a:r>
-            <a:endParaRPr lang="cs-CZ" dirty="0"/>
-          </a:p>
-        </p:txBody>
-      </p:sp>
-      <p:pic>
-        <p:nvPicPr>
-          <p:cNvPr id="6" name="Obrázek 5">
-            <a:extLst>
-              <a:ext uri="{FF2B5EF4-FFF2-40B4-BE49-F238E27FC236}">
-                <a16:creationId xmlns:a16="http://schemas.microsoft.com/office/drawing/2014/main" id="{8FBB8A25-9426-3E6A-AE36-4DDF1E613F65}"/>
-              </a:ext>
-            </a:extLst>
-          </p:cNvPr>
-          <p:cNvPicPr>
-            <a:picLocks noChangeAspect="1"/>
-          </p:cNvPicPr>
-          <p:nvPr/>
-        </p:nvPicPr>
-        <p:blipFill>
-          <a:blip r:embed="rId2"/>
-          <a:stretch>
-            <a:fillRect/>
-          </a:stretch>
-        </p:blipFill>
-        <p:spPr>
-          <a:xfrm>
-            <a:off x="363616" y="2160772"/>
-            <a:ext cx="5360910" cy="898263"/>
-          </a:xfrm>
-          <a:prstGeom prst="rect">
-            <a:avLst/>
-          </a:prstGeom>
-        </p:spPr>
-      </p:pic>
-      <p:pic>
-        <p:nvPicPr>
-          <p:cNvPr id="8" name="Obrázek 7">
-            <a:extLst>
-              <a:ext uri="{FF2B5EF4-FFF2-40B4-BE49-F238E27FC236}">
-                <a16:creationId xmlns:a16="http://schemas.microsoft.com/office/drawing/2014/main" id="{5E4A6091-6A6F-5F43-692F-A067E19B1473}"/>
-              </a:ext>
-            </a:extLst>
-          </p:cNvPr>
-          <p:cNvPicPr>
-            <a:picLocks noChangeAspect="1"/>
-          </p:cNvPicPr>
-          <p:nvPr/>
-        </p:nvPicPr>
-        <p:blipFill>
-          <a:blip r:embed="rId3">
-            <a:extLst>
-              <a:ext uri="{28A0092B-C50C-407E-A947-70E740481C1C}">
-                <a14:useLocalDpi xmlns:a14="http://schemas.microsoft.com/office/drawing/2010/main" val="0"/>
-              </a:ext>
-            </a:extLst>
-          </a:blip>
-          <a:stretch>
-            <a:fillRect/>
-          </a:stretch>
-        </p:blipFill>
-        <p:spPr>
-          <a:xfrm>
-            <a:off x="5724526" y="1465447"/>
-            <a:ext cx="5360910" cy="5219558"/>
-          </a:xfrm>
-          <a:prstGeom prst="rect">
-            <a:avLst/>
-          </a:prstGeom>
-        </p:spPr>
-      </p:pic>
-      <p:pic>
-        <p:nvPicPr>
-          <p:cNvPr id="10" name="Obrázek 9">
-            <a:extLst>
-              <a:ext uri="{FF2B5EF4-FFF2-40B4-BE49-F238E27FC236}">
-                <a16:creationId xmlns:a16="http://schemas.microsoft.com/office/drawing/2014/main" id="{27DF01A3-AE4F-DD67-C327-F846816D31C1}"/>
-              </a:ext>
-            </a:extLst>
-          </p:cNvPr>
-          <p:cNvPicPr>
-            <a:picLocks noChangeAspect="1"/>
-          </p:cNvPicPr>
-          <p:nvPr/>
-        </p:nvPicPr>
-        <p:blipFill>
-          <a:blip r:embed="rId4"/>
-          <a:stretch>
-            <a:fillRect/>
-          </a:stretch>
-        </p:blipFill>
-        <p:spPr>
-          <a:xfrm>
-            <a:off x="838200" y="4175253"/>
-            <a:ext cx="4522159" cy="1177797"/>
-          </a:xfrm>
-          <a:prstGeom prst="rect">
-            <a:avLst/>
-          </a:prstGeom>
-        </p:spPr>
-      </p:pic>
-    </p:spTree>
-    <p:extLst>
-      <p:ext uri="{BB962C8B-B14F-4D97-AF65-F5344CB8AC3E}">
-        <p14:creationId xmlns:p14="http://schemas.microsoft.com/office/powerpoint/2010/main" val="3056370280"/>
-      </p:ext>
-    </p:extLst>
-  </p:cSld>
-  <p:clrMapOvr>
-    <a:masterClrMapping/>
-  </p:clrMapOvr>
-</p:sld>
-</file>
-
-<file path=ppt/slides/slide9.xml><?xml version="1.0" encoding="utf-8"?>
-<p:sld xmlns:a="http://schemas.openxmlformats.org/drawingml/2006/main" xmlns:r="http://schemas.openxmlformats.org/officeDocument/2006/relationships" xmlns:p="http://schemas.openxmlformats.org/presentationml/2006/main">
-  <p:cSld>
-    <p:spTree>
-      <p:nvGrpSpPr>
-        <p:cNvPr id="1" name=""/>
-        <p:cNvGrpSpPr/>
-        <p:nvPr/>
-      </p:nvGrpSpPr>
-      <p:grpSpPr>
-        <a:xfrm>
-          <a:off x="0" y="0"/>
-          <a:ext cx="0" cy="0"/>
-          <a:chOff x="0" y="0"/>
-          <a:chExt cx="0" cy="0"/>
-        </a:xfrm>
-      </p:grpSpPr>
-      <p:sp>
-        <p:nvSpPr>
-          <p:cNvPr id="2" name="Nadpis 1">
-            <a:extLst>
-              <a:ext uri="{FF2B5EF4-FFF2-40B4-BE49-F238E27FC236}">
-                <a16:creationId xmlns:a16="http://schemas.microsoft.com/office/drawing/2014/main" id="{84ADE2E0-8DC8-AD51-BCF4-41720D770541}"/>
-              </a:ext>
-            </a:extLst>
-          </p:cNvPr>
-          <p:cNvSpPr>
-            <a:spLocks noGrp="1"/>
-          </p:cNvSpPr>
-          <p:nvPr>
-            <p:ph type="title"/>
-          </p:nvPr>
-        </p:nvSpPr>
-        <p:spPr/>
-        <p:txBody>
-          <a:bodyPr/>
-          <a:lstStyle/>
-          <a:p>
-            <a:r>
-              <a:rPr lang="cs-CZ" dirty="0" err="1"/>
-              <a:t>Residuals</a:t>
-            </a:r>
-            <a:endParaRPr lang="cs-CZ" dirty="0"/>
-          </a:p>
-        </p:txBody>
-      </p:sp>
-      <p:pic>
-        <p:nvPicPr>
-          <p:cNvPr id="7" name="Obrázek 6">
-            <a:extLst>
-              <a:ext uri="{FF2B5EF4-FFF2-40B4-BE49-F238E27FC236}">
-                <a16:creationId xmlns:a16="http://schemas.microsoft.com/office/drawing/2014/main" id="{C924DFF7-DE5E-111E-E6EB-B03F2F4437C6}"/>
-              </a:ext>
-            </a:extLst>
-          </p:cNvPr>
-          <p:cNvPicPr>
-            <a:picLocks noChangeAspect="1"/>
-          </p:cNvPicPr>
-          <p:nvPr/>
-        </p:nvPicPr>
-        <p:blipFill>
-          <a:blip r:embed="rId2"/>
-          <a:stretch>
-            <a:fillRect/>
-          </a:stretch>
-        </p:blipFill>
-        <p:spPr>
-          <a:xfrm>
-            <a:off x="5191087" y="204703"/>
-            <a:ext cx="6648145" cy="2902711"/>
-          </a:xfrm>
-          <a:prstGeom prst="rect">
-            <a:avLst/>
-          </a:prstGeom>
-        </p:spPr>
-      </p:pic>
-      <p:pic>
-        <p:nvPicPr>
-          <p:cNvPr id="5" name="Zástupný obsah 4">
-            <a:extLst>
-              <a:ext uri="{FF2B5EF4-FFF2-40B4-BE49-F238E27FC236}">
-                <a16:creationId xmlns:a16="http://schemas.microsoft.com/office/drawing/2014/main" id="{27E15DA9-96D3-3B68-27D2-235D1E2A2C95}"/>
-              </a:ext>
-            </a:extLst>
-          </p:cNvPr>
-          <p:cNvPicPr>
-            <a:picLocks noGrp="1" noChangeAspect="1"/>
-          </p:cNvPicPr>
-          <p:nvPr>
-            <p:ph idx="1"/>
-          </p:nvPr>
-        </p:nvPicPr>
-        <p:blipFill>
-          <a:blip r:embed="rId3">
-            <a:extLst>
-              <a:ext uri="{28A0092B-C50C-407E-A947-70E740481C1C}">
-                <a14:useLocalDpi xmlns:a14="http://schemas.microsoft.com/office/drawing/2010/main" val="0"/>
-              </a:ext>
-            </a:extLst>
-          </a:blip>
-          <a:stretch>
-            <a:fillRect/>
-          </a:stretch>
-        </p:blipFill>
-        <p:spPr>
-          <a:xfrm>
-            <a:off x="346230" y="2247191"/>
-            <a:ext cx="6648144" cy="4610809"/>
-          </a:xfrm>
-        </p:spPr>
-      </p:pic>
-    </p:spTree>
-    <p:extLst>
-      <p:ext uri="{BB962C8B-B14F-4D97-AF65-F5344CB8AC3E}">
-        <p14:creationId xmlns:p14="http://schemas.microsoft.com/office/powerpoint/2010/main" val="2383595441"/>
       </p:ext>
     </p:extLst>
   </p:cSld>

</xml_diff>